<commit_message>
Elaborate on lod generation, scene generation and specular color. Add images for lod comparison. Short captions for images.
</commit_message>
<xml_diff>
--- a/projects/raygen_filtering.pptx
+++ b/projects/raygen_filtering.pptx
@@ -104,6 +104,11 @@
       </a:defRPr>
     </a:lvl9pPr>
   </p:defaultTextStyle>
+  <p:extLst>
+    <p:ext uri="{EFAFB233-063F-42B5-8137-9DF3F51BA10A}">
+      <p15:sldGuideLst xmlns:p15="http://schemas.microsoft.com/office/powerpoint/2012/main"/>
+    </p:ext>
+  </p:extLst>
 </p:presentation>
 </file>
 
@@ -254,7 +259,7 @@
           <a:p>
             <a:fld id="{D63E578F-A602-4A39-8C8B-237FA4B9A4D2}" type="datetimeFigureOut">
               <a:rPr lang="de-DE" smtClean="0"/>
-              <a:t>16.05.2022</a:t>
+              <a:t>20.05.2022</a:t>
             </a:fld>
             <a:endParaRPr lang="de-DE"/>
           </a:p>
@@ -452,7 +457,7 @@
           <a:p>
             <a:fld id="{D63E578F-A602-4A39-8C8B-237FA4B9A4D2}" type="datetimeFigureOut">
               <a:rPr lang="de-DE" smtClean="0"/>
-              <a:t>16.05.2022</a:t>
+              <a:t>20.05.2022</a:t>
             </a:fld>
             <a:endParaRPr lang="de-DE"/>
           </a:p>
@@ -660,7 +665,7 @@
           <a:p>
             <a:fld id="{D63E578F-A602-4A39-8C8B-237FA4B9A4D2}" type="datetimeFigureOut">
               <a:rPr lang="de-DE" smtClean="0"/>
-              <a:t>16.05.2022</a:t>
+              <a:t>20.05.2022</a:t>
             </a:fld>
             <a:endParaRPr lang="de-DE"/>
           </a:p>
@@ -858,7 +863,7 @@
           <a:p>
             <a:fld id="{D63E578F-A602-4A39-8C8B-237FA4B9A4D2}" type="datetimeFigureOut">
               <a:rPr lang="de-DE" smtClean="0"/>
-              <a:t>16.05.2022</a:t>
+              <a:t>20.05.2022</a:t>
             </a:fld>
             <a:endParaRPr lang="de-DE"/>
           </a:p>
@@ -1133,7 +1138,7 @@
           <a:p>
             <a:fld id="{D63E578F-A602-4A39-8C8B-237FA4B9A4D2}" type="datetimeFigureOut">
               <a:rPr lang="de-DE" smtClean="0"/>
-              <a:t>16.05.2022</a:t>
+              <a:t>20.05.2022</a:t>
             </a:fld>
             <a:endParaRPr lang="de-DE"/>
           </a:p>
@@ -1398,7 +1403,7 @@
           <a:p>
             <a:fld id="{D63E578F-A602-4A39-8C8B-237FA4B9A4D2}" type="datetimeFigureOut">
               <a:rPr lang="de-DE" smtClean="0"/>
-              <a:t>16.05.2022</a:t>
+              <a:t>20.05.2022</a:t>
             </a:fld>
             <a:endParaRPr lang="de-DE"/>
           </a:p>
@@ -1810,7 +1815,7 @@
           <a:p>
             <a:fld id="{D63E578F-A602-4A39-8C8B-237FA4B9A4D2}" type="datetimeFigureOut">
               <a:rPr lang="de-DE" smtClean="0"/>
-              <a:t>16.05.2022</a:t>
+              <a:t>20.05.2022</a:t>
             </a:fld>
             <a:endParaRPr lang="de-DE"/>
           </a:p>
@@ -1951,7 +1956,7 @@
           <a:p>
             <a:fld id="{D63E578F-A602-4A39-8C8B-237FA4B9A4D2}" type="datetimeFigureOut">
               <a:rPr lang="de-DE" smtClean="0"/>
-              <a:t>16.05.2022</a:t>
+              <a:t>20.05.2022</a:t>
             </a:fld>
             <a:endParaRPr lang="de-DE"/>
           </a:p>
@@ -2064,7 +2069,7 @@
           <a:p>
             <a:fld id="{D63E578F-A602-4A39-8C8B-237FA4B9A4D2}" type="datetimeFigureOut">
               <a:rPr lang="de-DE" smtClean="0"/>
-              <a:t>16.05.2022</a:t>
+              <a:t>20.05.2022</a:t>
             </a:fld>
             <a:endParaRPr lang="de-DE"/>
           </a:p>
@@ -2375,7 +2380,7 @@
           <a:p>
             <a:fld id="{D63E578F-A602-4A39-8C8B-237FA4B9A4D2}" type="datetimeFigureOut">
               <a:rPr lang="de-DE" smtClean="0"/>
-              <a:t>16.05.2022</a:t>
+              <a:t>20.05.2022</a:t>
             </a:fld>
             <a:endParaRPr lang="de-DE"/>
           </a:p>
@@ -2663,7 +2668,7 @@
           <a:p>
             <a:fld id="{D63E578F-A602-4A39-8C8B-237FA4B9A4D2}" type="datetimeFigureOut">
               <a:rPr lang="de-DE" smtClean="0"/>
-              <a:t>16.05.2022</a:t>
+              <a:t>20.05.2022</a:t>
             </a:fld>
             <a:endParaRPr lang="de-DE"/>
           </a:p>
@@ -2904,7 +2909,7 @@
           <a:p>
             <a:fld id="{D63E578F-A602-4A39-8C8B-237FA4B9A4D2}" type="datetimeFigureOut">
               <a:rPr lang="de-DE" smtClean="0"/>
-              <a:t>16.05.2022</a:t>
+              <a:t>20.05.2022</a:t>
             </a:fld>
             <a:endParaRPr lang="de-DE"/>
           </a:p>
@@ -3323,10 +3328,10 @@
       </p:grpSpPr>
       <p:grpSp>
         <p:nvGrpSpPr>
-          <p:cNvPr id="4" name="Gruppieren 3">
-            <a:extLst>
-              <a:ext uri="{FF2B5EF4-FFF2-40B4-BE49-F238E27FC236}">
-                <a16:creationId xmlns:a16="http://schemas.microsoft.com/office/drawing/2014/main" id="{832D6EE3-4603-DB49-3A84-0BC17BBB8FD6}"/>
+          <p:cNvPr id="23" name="Gruppieren 22">
+            <a:extLst>
+              <a:ext uri="{FF2B5EF4-FFF2-40B4-BE49-F238E27FC236}">
+                <a16:creationId xmlns:a16="http://schemas.microsoft.com/office/drawing/2014/main" id="{F2115364-B95B-6F0F-784C-FE72CF110318}"/>
               </a:ext>
             </a:extLst>
           </p:cNvPr>
@@ -3335,18 +3340,18 @@
         </p:nvGrpSpPr>
         <p:grpSpPr>
           <a:xfrm>
-            <a:off x="3014548" y="3340673"/>
-            <a:ext cx="2048103" cy="1568299"/>
-            <a:chOff x="2890497" y="2322203"/>
-            <a:chExt cx="2048103" cy="1568299"/>
+            <a:off x="3127248" y="3206496"/>
+            <a:ext cx="2292096" cy="1822704"/>
+            <a:chOff x="3127248" y="3206496"/>
+            <a:chExt cx="2292096" cy="1822704"/>
           </a:xfrm>
         </p:grpSpPr>
         <p:sp>
           <p:nvSpPr>
-            <p:cNvPr id="5" name="Rechteck 4">
+            <p:cNvPr id="2" name="Rechteck 1">
               <a:extLst>
                 <a:ext uri="{FF2B5EF4-FFF2-40B4-BE49-F238E27FC236}">
-                  <a16:creationId xmlns:a16="http://schemas.microsoft.com/office/drawing/2014/main" id="{EC3B353A-37BA-0509-BD2C-DA2B57F17CFB}"/>
+                  <a16:creationId xmlns:a16="http://schemas.microsoft.com/office/drawing/2014/main" id="{E0F0CEDB-00EB-19AF-1644-77AACF0E96DC}"/>
                 </a:ext>
               </a:extLst>
             </p:cNvPr>
@@ -3355,25 +3360,33 @@
           </p:nvSpPr>
           <p:spPr>
             <a:xfrm>
-              <a:off x="3479180" y="2579649"/>
-              <a:ext cx="900000" cy="900000"/>
+              <a:off x="3127248" y="3206496"/>
+              <a:ext cx="2292096" cy="1822704"/>
             </a:xfrm>
             <a:prstGeom prst="rect">
               <a:avLst/>
             </a:prstGeom>
+            <a:solidFill>
+              <a:schemeClr val="bg1"/>
+            </a:solidFill>
+            <a:ln>
+              <a:noFill/>
+            </a:ln>
           </p:spPr>
           <p:style>
             <a:lnRef idx="2">
-              <a:schemeClr val="dk1"/>
+              <a:schemeClr val="accent1">
+                <a:shade val="50000"/>
+              </a:schemeClr>
             </a:lnRef>
             <a:fillRef idx="1">
-              <a:schemeClr val="lt1"/>
+              <a:schemeClr val="accent1"/>
             </a:fillRef>
             <a:effectRef idx="0">
-              <a:schemeClr val="dk1"/>
+              <a:schemeClr val="accent1"/>
             </a:effectRef>
             <a:fontRef idx="minor">
-              <a:schemeClr val="dk1"/>
+              <a:schemeClr val="lt1"/>
             </a:fontRef>
           </p:style>
           <p:txBody>
@@ -3385,307 +3398,372 @@
             </a:p>
           </p:txBody>
         </p:sp>
-        <p:cxnSp>
-          <p:nvCxnSpPr>
-            <p:cNvPr id="6" name="Gerade Verbindung mit Pfeil 5">
+        <p:grpSp>
+          <p:nvGrpSpPr>
+            <p:cNvPr id="4" name="Gruppieren 3">
               <a:extLst>
                 <a:ext uri="{FF2B5EF4-FFF2-40B4-BE49-F238E27FC236}">
-                  <a16:creationId xmlns:a16="http://schemas.microsoft.com/office/drawing/2014/main" id="{ED3A6D5C-C36B-1293-2FDC-4413A8EAA090}"/>
+                  <a16:creationId xmlns:a16="http://schemas.microsoft.com/office/drawing/2014/main" id="{832D6EE3-4603-DB49-3A84-0BC17BBB8FD6}"/>
                 </a:ext>
               </a:extLst>
             </p:cNvPr>
-            <p:cNvCxnSpPr>
-              <a:cxnSpLocks/>
-            </p:cNvCxnSpPr>
+            <p:cNvGrpSpPr/>
             <p:nvPr/>
-          </p:nvCxnSpPr>
-          <p:spPr>
+          </p:nvGrpSpPr>
+          <p:grpSpPr>
             <a:xfrm>
-              <a:off x="4038600" y="3129775"/>
-              <a:ext cx="900000" cy="0"/>
+              <a:off x="3229521" y="3341029"/>
+              <a:ext cx="2048103" cy="1568299"/>
+              <a:chOff x="2890497" y="2322203"/>
+              <a:chExt cx="2048103" cy="1568299"/>
             </a:xfrm>
-            <a:prstGeom prst="straightConnector1">
-              <a:avLst/>
-            </a:prstGeom>
-            <a:ln>
-              <a:headEnd type="oval" w="med" len="med"/>
-              <a:tailEnd type="triangle" w="med" len="med"/>
-            </a:ln>
-          </p:spPr>
-          <p:style>
-            <a:lnRef idx="1">
-              <a:schemeClr val="dk1"/>
-            </a:lnRef>
-            <a:fillRef idx="0">
-              <a:schemeClr val="dk1"/>
-            </a:fillRef>
-            <a:effectRef idx="0">
-              <a:schemeClr val="dk1"/>
-            </a:effectRef>
-            <a:fontRef idx="minor">
-              <a:schemeClr val="tx1"/>
-            </a:fontRef>
-          </p:style>
-        </p:cxnSp>
-        <p:cxnSp>
-          <p:nvCxnSpPr>
-            <p:cNvPr id="7" name="Gerade Verbindung mit Pfeil 6">
-              <a:extLst>
-                <a:ext uri="{FF2B5EF4-FFF2-40B4-BE49-F238E27FC236}">
-                  <a16:creationId xmlns:a16="http://schemas.microsoft.com/office/drawing/2014/main" id="{EBB964B0-5F8D-6B10-C165-C320FAA30FAA}"/>
-                </a:ext>
-              </a:extLst>
-            </p:cNvPr>
-            <p:cNvCxnSpPr>
-              <a:cxnSpLocks/>
-            </p:cNvCxnSpPr>
-            <p:nvPr/>
-          </p:nvCxnSpPr>
-          <p:spPr>
-            <a:xfrm flipV="1">
-              <a:off x="3656092" y="2673249"/>
-              <a:ext cx="546176" cy="712800"/>
-            </a:xfrm>
-            <a:prstGeom prst="straightConnector1">
-              <a:avLst/>
-            </a:prstGeom>
-            <a:ln>
-              <a:headEnd type="oval" w="med" len="med"/>
-              <a:tailEnd type="triangle" w="med" len="med"/>
-            </a:ln>
-          </p:spPr>
-          <p:style>
-            <a:lnRef idx="1">
-              <a:schemeClr val="dk1"/>
-            </a:lnRef>
-            <a:fillRef idx="0">
-              <a:schemeClr val="dk1"/>
-            </a:fillRef>
-            <a:effectRef idx="0">
-              <a:schemeClr val="dk1"/>
-            </a:effectRef>
-            <a:fontRef idx="minor">
-              <a:schemeClr val="tx1"/>
-            </a:fontRef>
-          </p:style>
-        </p:cxnSp>
-        <p:cxnSp>
-          <p:nvCxnSpPr>
-            <p:cNvPr id="8" name="Gerade Verbindung mit Pfeil 7">
-              <a:extLst>
-                <a:ext uri="{FF2B5EF4-FFF2-40B4-BE49-F238E27FC236}">
-                  <a16:creationId xmlns:a16="http://schemas.microsoft.com/office/drawing/2014/main" id="{806C77FE-8888-E051-3A15-BCB8FDEFDBA8}"/>
-                </a:ext>
-              </a:extLst>
-            </p:cNvPr>
-            <p:cNvCxnSpPr>
-              <a:cxnSpLocks/>
-            </p:cNvCxnSpPr>
-            <p:nvPr/>
-          </p:nvCxnSpPr>
-          <p:spPr>
-            <a:xfrm>
-              <a:off x="3870519" y="3282102"/>
-              <a:ext cx="663498" cy="608400"/>
-            </a:xfrm>
-            <a:prstGeom prst="straightConnector1">
-              <a:avLst/>
-            </a:prstGeom>
-            <a:ln>
-              <a:headEnd type="oval" w="med" len="med"/>
-              <a:tailEnd type="triangle" w="med" len="med"/>
-            </a:ln>
-          </p:spPr>
-          <p:style>
-            <a:lnRef idx="1">
-              <a:schemeClr val="dk1"/>
-            </a:lnRef>
-            <a:fillRef idx="0">
-              <a:schemeClr val="dk1"/>
-            </a:fillRef>
-            <a:effectRef idx="0">
-              <a:schemeClr val="dk1"/>
-            </a:effectRef>
-            <a:fontRef idx="minor">
-              <a:schemeClr val="tx1"/>
-            </a:fontRef>
-          </p:style>
-        </p:cxnSp>
-        <p:cxnSp>
-          <p:nvCxnSpPr>
-            <p:cNvPr id="9" name="Gerade Verbindung mit Pfeil 8">
-              <a:extLst>
-                <a:ext uri="{FF2B5EF4-FFF2-40B4-BE49-F238E27FC236}">
-                  <a16:creationId xmlns:a16="http://schemas.microsoft.com/office/drawing/2014/main" id="{AFE6E383-899D-0AD5-C0F9-C3C1C018DE21}"/>
-                </a:ext>
-              </a:extLst>
-            </p:cNvPr>
-            <p:cNvCxnSpPr>
-              <a:cxnSpLocks/>
-            </p:cNvCxnSpPr>
-            <p:nvPr/>
-          </p:nvCxnSpPr>
-          <p:spPr>
-            <a:xfrm flipH="1" flipV="1">
-              <a:off x="3501255" y="2322203"/>
-              <a:ext cx="640800" cy="628185"/>
-            </a:xfrm>
-            <a:prstGeom prst="straightConnector1">
-              <a:avLst/>
-            </a:prstGeom>
-            <a:ln>
-              <a:headEnd type="oval" w="med" len="med"/>
-              <a:tailEnd type="triangle" w="med" len="med"/>
-            </a:ln>
-          </p:spPr>
-          <p:style>
-            <a:lnRef idx="1">
-              <a:schemeClr val="dk1"/>
-            </a:lnRef>
-            <a:fillRef idx="0">
-              <a:schemeClr val="dk1"/>
-            </a:fillRef>
-            <a:effectRef idx="0">
-              <a:schemeClr val="dk1"/>
-            </a:effectRef>
-            <a:fontRef idx="minor">
-              <a:schemeClr val="tx1"/>
-            </a:fontRef>
-          </p:style>
-        </p:cxnSp>
-        <p:cxnSp>
-          <p:nvCxnSpPr>
-            <p:cNvPr id="10" name="Gerade Verbindung mit Pfeil 9">
-              <a:extLst>
-                <a:ext uri="{FF2B5EF4-FFF2-40B4-BE49-F238E27FC236}">
-                  <a16:creationId xmlns:a16="http://schemas.microsoft.com/office/drawing/2014/main" id="{4F7381C3-7330-FEE0-53E9-B4F1848E1CD0}"/>
-                </a:ext>
-              </a:extLst>
-            </p:cNvPr>
-            <p:cNvCxnSpPr>
-              <a:cxnSpLocks/>
-            </p:cNvCxnSpPr>
-            <p:nvPr/>
-          </p:nvCxnSpPr>
-          <p:spPr>
-            <a:xfrm flipH="1">
-              <a:off x="2890497" y="2764988"/>
-              <a:ext cx="771643" cy="464400"/>
-            </a:xfrm>
-            <a:prstGeom prst="straightConnector1">
-              <a:avLst/>
-            </a:prstGeom>
-            <a:ln>
-              <a:headEnd type="oval" w="med" len="med"/>
-              <a:tailEnd type="triangle" w="med" len="med"/>
-            </a:ln>
-          </p:spPr>
-          <p:style>
-            <a:lnRef idx="1">
-              <a:schemeClr val="dk1"/>
-            </a:lnRef>
-            <a:fillRef idx="0">
-              <a:schemeClr val="dk1"/>
-            </a:fillRef>
-            <a:effectRef idx="0">
-              <a:schemeClr val="dk1"/>
-            </a:effectRef>
-            <a:fontRef idx="minor">
-              <a:schemeClr val="tx1"/>
-            </a:fontRef>
-          </p:style>
-        </p:cxnSp>
-        <p:cxnSp>
-          <p:nvCxnSpPr>
-            <p:cNvPr id="11" name="Gerade Verbindung mit Pfeil 10">
-              <a:extLst>
-                <a:ext uri="{FF2B5EF4-FFF2-40B4-BE49-F238E27FC236}">
-                  <a16:creationId xmlns:a16="http://schemas.microsoft.com/office/drawing/2014/main" id="{390A679E-497E-439C-FC88-19615127E615}"/>
-                </a:ext>
-              </a:extLst>
-            </p:cNvPr>
-            <p:cNvCxnSpPr>
-              <a:cxnSpLocks/>
-            </p:cNvCxnSpPr>
-            <p:nvPr/>
-          </p:nvCxnSpPr>
-          <p:spPr>
-            <a:xfrm>
-              <a:off x="3541329" y="2901376"/>
-              <a:ext cx="756000" cy="489600"/>
-            </a:xfrm>
-            <a:prstGeom prst="straightConnector1">
-              <a:avLst/>
-            </a:prstGeom>
-            <a:ln>
-              <a:headEnd type="oval" w="med" len="med"/>
-              <a:tailEnd type="triangle" w="med" len="med"/>
-            </a:ln>
-          </p:spPr>
-          <p:style>
-            <a:lnRef idx="1">
-              <a:schemeClr val="dk1"/>
-            </a:lnRef>
-            <a:fillRef idx="0">
-              <a:schemeClr val="dk1"/>
-            </a:fillRef>
-            <a:effectRef idx="0">
-              <a:schemeClr val="dk1"/>
-            </a:effectRef>
-            <a:fontRef idx="minor">
-              <a:schemeClr val="tx1"/>
-            </a:fontRef>
-          </p:style>
-        </p:cxnSp>
-        <p:cxnSp>
-          <p:nvCxnSpPr>
-            <p:cNvPr id="12" name="Gerade Verbindung mit Pfeil 11">
-              <a:extLst>
-                <a:ext uri="{FF2B5EF4-FFF2-40B4-BE49-F238E27FC236}">
-                  <a16:creationId xmlns:a16="http://schemas.microsoft.com/office/drawing/2014/main" id="{C1995A32-8290-66E8-499D-977F9BE87749}"/>
-                </a:ext>
-              </a:extLst>
-            </p:cNvPr>
-            <p:cNvCxnSpPr>
-              <a:cxnSpLocks/>
-            </p:cNvCxnSpPr>
-            <p:nvPr/>
-          </p:nvCxnSpPr>
-          <p:spPr>
-            <a:xfrm flipH="1" flipV="1">
-              <a:off x="2994773" y="2488743"/>
-              <a:ext cx="630000" cy="645880"/>
-            </a:xfrm>
-            <a:prstGeom prst="straightConnector1">
-              <a:avLst/>
-            </a:prstGeom>
-            <a:ln>
-              <a:headEnd type="oval" w="med" len="med"/>
-              <a:tailEnd type="triangle" w="med" len="med"/>
-            </a:ln>
-          </p:spPr>
-          <p:style>
-            <a:lnRef idx="1">
-              <a:schemeClr val="dk1"/>
-            </a:lnRef>
-            <a:fillRef idx="0">
-              <a:schemeClr val="dk1"/>
-            </a:fillRef>
-            <a:effectRef idx="0">
-              <a:schemeClr val="dk1"/>
-            </a:effectRef>
-            <a:fontRef idx="minor">
-              <a:schemeClr val="tx1"/>
-            </a:fontRef>
-          </p:style>
-        </p:cxnSp>
+          </p:grpSpPr>
+          <p:sp>
+            <p:nvSpPr>
+              <p:cNvPr id="5" name="Rechteck 4">
+                <a:extLst>
+                  <a:ext uri="{FF2B5EF4-FFF2-40B4-BE49-F238E27FC236}">
+                    <a16:creationId xmlns:a16="http://schemas.microsoft.com/office/drawing/2014/main" id="{EC3B353A-37BA-0509-BD2C-DA2B57F17CFB}"/>
+                  </a:ext>
+                </a:extLst>
+              </p:cNvPr>
+              <p:cNvSpPr/>
+              <p:nvPr/>
+            </p:nvSpPr>
+            <p:spPr>
+              <a:xfrm>
+                <a:off x="3479180" y="2579649"/>
+                <a:ext cx="900000" cy="900000"/>
+              </a:xfrm>
+              <a:prstGeom prst="rect">
+                <a:avLst/>
+              </a:prstGeom>
+            </p:spPr>
+            <p:style>
+              <a:lnRef idx="2">
+                <a:schemeClr val="dk1"/>
+              </a:lnRef>
+              <a:fillRef idx="1">
+                <a:schemeClr val="lt1"/>
+              </a:fillRef>
+              <a:effectRef idx="0">
+                <a:schemeClr val="dk1"/>
+              </a:effectRef>
+              <a:fontRef idx="minor">
+                <a:schemeClr val="dk1"/>
+              </a:fontRef>
+            </p:style>
+            <p:txBody>
+              <a:bodyPr rtlCol="0" anchor="ctr"/>
+              <a:lstStyle/>
+              <a:p>
+                <a:pPr algn="ctr"/>
+                <a:endParaRPr lang="de-DE"/>
+              </a:p>
+            </p:txBody>
+          </p:sp>
+          <p:cxnSp>
+            <p:nvCxnSpPr>
+              <p:cNvPr id="6" name="Gerade Verbindung mit Pfeil 5">
+                <a:extLst>
+                  <a:ext uri="{FF2B5EF4-FFF2-40B4-BE49-F238E27FC236}">
+                    <a16:creationId xmlns:a16="http://schemas.microsoft.com/office/drawing/2014/main" id="{ED3A6D5C-C36B-1293-2FDC-4413A8EAA090}"/>
+                  </a:ext>
+                </a:extLst>
+              </p:cNvPr>
+              <p:cNvCxnSpPr>
+                <a:cxnSpLocks/>
+              </p:cNvCxnSpPr>
+              <p:nvPr/>
+            </p:nvCxnSpPr>
+            <p:spPr>
+              <a:xfrm>
+                <a:off x="4038600" y="3129775"/>
+                <a:ext cx="900000" cy="0"/>
+              </a:xfrm>
+              <a:prstGeom prst="straightConnector1">
+                <a:avLst/>
+              </a:prstGeom>
+              <a:ln>
+                <a:headEnd type="oval" w="med" len="med"/>
+                <a:tailEnd type="triangle" w="med" len="med"/>
+              </a:ln>
+            </p:spPr>
+            <p:style>
+              <a:lnRef idx="1">
+                <a:schemeClr val="dk1"/>
+              </a:lnRef>
+              <a:fillRef idx="0">
+                <a:schemeClr val="dk1"/>
+              </a:fillRef>
+              <a:effectRef idx="0">
+                <a:schemeClr val="dk1"/>
+              </a:effectRef>
+              <a:fontRef idx="minor">
+                <a:schemeClr val="tx1"/>
+              </a:fontRef>
+            </p:style>
+          </p:cxnSp>
+          <p:cxnSp>
+            <p:nvCxnSpPr>
+              <p:cNvPr id="7" name="Gerade Verbindung mit Pfeil 6">
+                <a:extLst>
+                  <a:ext uri="{FF2B5EF4-FFF2-40B4-BE49-F238E27FC236}">
+                    <a16:creationId xmlns:a16="http://schemas.microsoft.com/office/drawing/2014/main" id="{EBB964B0-5F8D-6B10-C165-C320FAA30FAA}"/>
+                  </a:ext>
+                </a:extLst>
+              </p:cNvPr>
+              <p:cNvCxnSpPr>
+                <a:cxnSpLocks/>
+              </p:cNvCxnSpPr>
+              <p:nvPr/>
+            </p:nvCxnSpPr>
+            <p:spPr>
+              <a:xfrm flipV="1">
+                <a:off x="3656092" y="2673249"/>
+                <a:ext cx="546176" cy="712800"/>
+              </a:xfrm>
+              <a:prstGeom prst="straightConnector1">
+                <a:avLst/>
+              </a:prstGeom>
+              <a:ln>
+                <a:headEnd type="oval" w="med" len="med"/>
+                <a:tailEnd type="triangle" w="med" len="med"/>
+              </a:ln>
+            </p:spPr>
+            <p:style>
+              <a:lnRef idx="1">
+                <a:schemeClr val="dk1"/>
+              </a:lnRef>
+              <a:fillRef idx="0">
+                <a:schemeClr val="dk1"/>
+              </a:fillRef>
+              <a:effectRef idx="0">
+                <a:schemeClr val="dk1"/>
+              </a:effectRef>
+              <a:fontRef idx="minor">
+                <a:schemeClr val="tx1"/>
+              </a:fontRef>
+            </p:style>
+          </p:cxnSp>
+          <p:cxnSp>
+            <p:nvCxnSpPr>
+              <p:cNvPr id="8" name="Gerade Verbindung mit Pfeil 7">
+                <a:extLst>
+                  <a:ext uri="{FF2B5EF4-FFF2-40B4-BE49-F238E27FC236}">
+                    <a16:creationId xmlns:a16="http://schemas.microsoft.com/office/drawing/2014/main" id="{806C77FE-8888-E051-3A15-BCB8FDEFDBA8}"/>
+                  </a:ext>
+                </a:extLst>
+              </p:cNvPr>
+              <p:cNvCxnSpPr>
+                <a:cxnSpLocks/>
+              </p:cNvCxnSpPr>
+              <p:nvPr/>
+            </p:nvCxnSpPr>
+            <p:spPr>
+              <a:xfrm>
+                <a:off x="3870519" y="3282102"/>
+                <a:ext cx="663498" cy="608400"/>
+              </a:xfrm>
+              <a:prstGeom prst="straightConnector1">
+                <a:avLst/>
+              </a:prstGeom>
+              <a:ln>
+                <a:headEnd type="oval" w="med" len="med"/>
+                <a:tailEnd type="triangle" w="med" len="med"/>
+              </a:ln>
+            </p:spPr>
+            <p:style>
+              <a:lnRef idx="1">
+                <a:schemeClr val="dk1"/>
+              </a:lnRef>
+              <a:fillRef idx="0">
+                <a:schemeClr val="dk1"/>
+              </a:fillRef>
+              <a:effectRef idx="0">
+                <a:schemeClr val="dk1"/>
+              </a:effectRef>
+              <a:fontRef idx="minor">
+                <a:schemeClr val="tx1"/>
+              </a:fontRef>
+            </p:style>
+          </p:cxnSp>
+          <p:cxnSp>
+            <p:nvCxnSpPr>
+              <p:cNvPr id="9" name="Gerade Verbindung mit Pfeil 8">
+                <a:extLst>
+                  <a:ext uri="{FF2B5EF4-FFF2-40B4-BE49-F238E27FC236}">
+                    <a16:creationId xmlns:a16="http://schemas.microsoft.com/office/drawing/2014/main" id="{AFE6E383-899D-0AD5-C0F9-C3C1C018DE21}"/>
+                  </a:ext>
+                </a:extLst>
+              </p:cNvPr>
+              <p:cNvCxnSpPr>
+                <a:cxnSpLocks/>
+              </p:cNvCxnSpPr>
+              <p:nvPr/>
+            </p:nvCxnSpPr>
+            <p:spPr>
+              <a:xfrm flipH="1" flipV="1">
+                <a:off x="3501255" y="2322203"/>
+                <a:ext cx="640800" cy="628185"/>
+              </a:xfrm>
+              <a:prstGeom prst="straightConnector1">
+                <a:avLst/>
+              </a:prstGeom>
+              <a:ln>
+                <a:headEnd type="oval" w="med" len="med"/>
+                <a:tailEnd type="triangle" w="med" len="med"/>
+              </a:ln>
+            </p:spPr>
+            <p:style>
+              <a:lnRef idx="1">
+                <a:schemeClr val="dk1"/>
+              </a:lnRef>
+              <a:fillRef idx="0">
+                <a:schemeClr val="dk1"/>
+              </a:fillRef>
+              <a:effectRef idx="0">
+                <a:schemeClr val="dk1"/>
+              </a:effectRef>
+              <a:fontRef idx="minor">
+                <a:schemeClr val="tx1"/>
+              </a:fontRef>
+            </p:style>
+          </p:cxnSp>
+          <p:cxnSp>
+            <p:nvCxnSpPr>
+              <p:cNvPr id="10" name="Gerade Verbindung mit Pfeil 9">
+                <a:extLst>
+                  <a:ext uri="{FF2B5EF4-FFF2-40B4-BE49-F238E27FC236}">
+                    <a16:creationId xmlns:a16="http://schemas.microsoft.com/office/drawing/2014/main" id="{4F7381C3-7330-FEE0-53E9-B4F1848E1CD0}"/>
+                  </a:ext>
+                </a:extLst>
+              </p:cNvPr>
+              <p:cNvCxnSpPr>
+                <a:cxnSpLocks/>
+              </p:cNvCxnSpPr>
+              <p:nvPr/>
+            </p:nvCxnSpPr>
+            <p:spPr>
+              <a:xfrm flipH="1">
+                <a:off x="2890497" y="2764988"/>
+                <a:ext cx="771643" cy="464400"/>
+              </a:xfrm>
+              <a:prstGeom prst="straightConnector1">
+                <a:avLst/>
+              </a:prstGeom>
+              <a:ln>
+                <a:headEnd type="oval" w="med" len="med"/>
+                <a:tailEnd type="triangle" w="med" len="med"/>
+              </a:ln>
+            </p:spPr>
+            <p:style>
+              <a:lnRef idx="1">
+                <a:schemeClr val="dk1"/>
+              </a:lnRef>
+              <a:fillRef idx="0">
+                <a:schemeClr val="dk1"/>
+              </a:fillRef>
+              <a:effectRef idx="0">
+                <a:schemeClr val="dk1"/>
+              </a:effectRef>
+              <a:fontRef idx="minor">
+                <a:schemeClr val="tx1"/>
+              </a:fontRef>
+            </p:style>
+          </p:cxnSp>
+          <p:cxnSp>
+            <p:nvCxnSpPr>
+              <p:cNvPr id="11" name="Gerade Verbindung mit Pfeil 10">
+                <a:extLst>
+                  <a:ext uri="{FF2B5EF4-FFF2-40B4-BE49-F238E27FC236}">
+                    <a16:creationId xmlns:a16="http://schemas.microsoft.com/office/drawing/2014/main" id="{390A679E-497E-439C-FC88-19615127E615}"/>
+                  </a:ext>
+                </a:extLst>
+              </p:cNvPr>
+              <p:cNvCxnSpPr>
+                <a:cxnSpLocks/>
+              </p:cNvCxnSpPr>
+              <p:nvPr/>
+            </p:nvCxnSpPr>
+            <p:spPr>
+              <a:xfrm>
+                <a:off x="3541329" y="2901376"/>
+                <a:ext cx="756000" cy="489600"/>
+              </a:xfrm>
+              <a:prstGeom prst="straightConnector1">
+                <a:avLst/>
+              </a:prstGeom>
+              <a:ln>
+                <a:headEnd type="oval" w="med" len="med"/>
+                <a:tailEnd type="triangle" w="med" len="med"/>
+              </a:ln>
+            </p:spPr>
+            <p:style>
+              <a:lnRef idx="1">
+                <a:schemeClr val="dk1"/>
+              </a:lnRef>
+              <a:fillRef idx="0">
+                <a:schemeClr val="dk1"/>
+              </a:fillRef>
+              <a:effectRef idx="0">
+                <a:schemeClr val="dk1"/>
+              </a:effectRef>
+              <a:fontRef idx="minor">
+                <a:schemeClr val="tx1"/>
+              </a:fontRef>
+            </p:style>
+          </p:cxnSp>
+          <p:cxnSp>
+            <p:nvCxnSpPr>
+              <p:cNvPr id="12" name="Gerade Verbindung mit Pfeil 11">
+                <a:extLst>
+                  <a:ext uri="{FF2B5EF4-FFF2-40B4-BE49-F238E27FC236}">
+                    <a16:creationId xmlns:a16="http://schemas.microsoft.com/office/drawing/2014/main" id="{C1995A32-8290-66E8-499D-977F9BE87749}"/>
+                  </a:ext>
+                </a:extLst>
+              </p:cNvPr>
+              <p:cNvCxnSpPr>
+                <a:cxnSpLocks/>
+              </p:cNvCxnSpPr>
+              <p:nvPr/>
+            </p:nvCxnSpPr>
+            <p:spPr>
+              <a:xfrm flipH="1" flipV="1">
+                <a:off x="2994773" y="2488743"/>
+                <a:ext cx="630000" cy="645880"/>
+              </a:xfrm>
+              <a:prstGeom prst="straightConnector1">
+                <a:avLst/>
+              </a:prstGeom>
+              <a:ln>
+                <a:headEnd type="oval" w="med" len="med"/>
+                <a:tailEnd type="triangle" w="med" len="med"/>
+              </a:ln>
+            </p:spPr>
+            <p:style>
+              <a:lnRef idx="1">
+                <a:schemeClr val="dk1"/>
+              </a:lnRef>
+              <a:fillRef idx="0">
+                <a:schemeClr val="dk1"/>
+              </a:fillRef>
+              <a:effectRef idx="0">
+                <a:schemeClr val="dk1"/>
+              </a:effectRef>
+              <a:fontRef idx="minor">
+                <a:schemeClr val="tx1"/>
+              </a:fontRef>
+            </p:style>
+          </p:cxnSp>
+        </p:grpSp>
       </p:grpSp>
       <p:grpSp>
         <p:nvGrpSpPr>
-          <p:cNvPr id="13" name="Gruppieren 12">
-            <a:extLst>
-              <a:ext uri="{FF2B5EF4-FFF2-40B4-BE49-F238E27FC236}">
-                <a16:creationId xmlns:a16="http://schemas.microsoft.com/office/drawing/2014/main" id="{E792103B-8DB5-B6B4-34FA-1DAF4A86AFA7}"/>
+          <p:cNvPr id="3" name="Gruppieren 2">
+            <a:extLst>
+              <a:ext uri="{FF2B5EF4-FFF2-40B4-BE49-F238E27FC236}">
+                <a16:creationId xmlns:a16="http://schemas.microsoft.com/office/drawing/2014/main" id="{7FC0E3DC-BA91-46FB-1ED0-3300C5C08029}"/>
               </a:ext>
             </a:extLst>
           </p:cNvPr>
@@ -3694,18 +3772,18 @@
         </p:nvGrpSpPr>
         <p:grpSpPr>
           <a:xfrm>
-            <a:off x="7944600" y="3382119"/>
-            <a:ext cx="1332000" cy="1332000"/>
-            <a:chOff x="7937400" y="2158007"/>
-            <a:chExt cx="1332000" cy="1332000"/>
+            <a:off x="7458536" y="3206496"/>
+            <a:ext cx="2292096" cy="1822704"/>
+            <a:chOff x="7458536" y="3206496"/>
+            <a:chExt cx="2292096" cy="1822704"/>
           </a:xfrm>
         </p:grpSpPr>
         <p:sp>
           <p:nvSpPr>
-            <p:cNvPr id="14" name="Rechteck 13">
+            <p:cNvPr id="22" name="Rechteck 21">
               <a:extLst>
                 <a:ext uri="{FF2B5EF4-FFF2-40B4-BE49-F238E27FC236}">
-                  <a16:creationId xmlns:a16="http://schemas.microsoft.com/office/drawing/2014/main" id="{DAB66B57-29EF-F3AE-E654-955382733B15}"/>
+                  <a16:creationId xmlns:a16="http://schemas.microsoft.com/office/drawing/2014/main" id="{60FFFF90-D9AD-9034-E870-5CA39EBEC959}"/>
                 </a:ext>
               </a:extLst>
             </p:cNvPr>
@@ -3714,25 +3792,33 @@
           </p:nvSpPr>
           <p:spPr>
             <a:xfrm>
-              <a:off x="8153400" y="2374977"/>
-              <a:ext cx="900000" cy="900000"/>
+              <a:off x="7458536" y="3206496"/>
+              <a:ext cx="2292096" cy="1822704"/>
             </a:xfrm>
             <a:prstGeom prst="rect">
               <a:avLst/>
             </a:prstGeom>
+            <a:solidFill>
+              <a:schemeClr val="bg1"/>
+            </a:solidFill>
+            <a:ln>
+              <a:noFill/>
+            </a:ln>
           </p:spPr>
           <p:style>
             <a:lnRef idx="2">
-              <a:schemeClr val="dk1"/>
+              <a:schemeClr val="accent1">
+                <a:shade val="50000"/>
+              </a:schemeClr>
             </a:lnRef>
             <a:fillRef idx="1">
-              <a:schemeClr val="lt1"/>
+              <a:schemeClr val="accent1"/>
             </a:fillRef>
             <a:effectRef idx="0">
-              <a:schemeClr val="dk1"/>
+              <a:schemeClr val="accent1"/>
             </a:effectRef>
             <a:fontRef idx="minor">
-              <a:schemeClr val="dk1"/>
+              <a:schemeClr val="lt1"/>
             </a:fontRef>
           </p:style>
           <p:txBody>
@@ -3744,303 +3830,368 @@
             </a:p>
           </p:txBody>
         </p:sp>
-        <p:sp>
-          <p:nvSpPr>
-            <p:cNvPr id="15" name="Ellipse 14">
+        <p:grpSp>
+          <p:nvGrpSpPr>
+            <p:cNvPr id="13" name="Gruppieren 12">
               <a:extLst>
                 <a:ext uri="{FF2B5EF4-FFF2-40B4-BE49-F238E27FC236}">
-                  <a16:creationId xmlns:a16="http://schemas.microsoft.com/office/drawing/2014/main" id="{B7ECE6AF-9A22-BE71-BC34-F021F48D1F17}"/>
+                  <a16:creationId xmlns:a16="http://schemas.microsoft.com/office/drawing/2014/main" id="{E792103B-8DB5-B6B4-34FA-1DAF4A86AFA7}"/>
                 </a:ext>
               </a:extLst>
             </p:cNvPr>
-            <p:cNvSpPr/>
+            <p:cNvGrpSpPr/>
             <p:nvPr/>
-          </p:nvSpPr>
-          <p:spPr>
+          </p:nvGrpSpPr>
+          <p:grpSpPr>
             <a:xfrm>
-              <a:off x="7937400" y="2158007"/>
+              <a:off x="7944600" y="3382119"/>
               <a:ext cx="1332000" cy="1332000"/>
+              <a:chOff x="7937400" y="2158007"/>
+              <a:chExt cx="1332000" cy="1332000"/>
             </a:xfrm>
-            <a:prstGeom prst="ellipse">
-              <a:avLst/>
-            </a:prstGeom>
-            <a:noFill/>
-          </p:spPr>
-          <p:style>
-            <a:lnRef idx="2">
-              <a:schemeClr val="dk1"/>
-            </a:lnRef>
-            <a:fillRef idx="1">
-              <a:schemeClr val="lt1"/>
-            </a:fillRef>
-            <a:effectRef idx="0">
-              <a:schemeClr val="dk1"/>
-            </a:effectRef>
-            <a:fontRef idx="minor">
-              <a:schemeClr val="dk1"/>
-            </a:fontRef>
-          </p:style>
-          <p:txBody>
-            <a:bodyPr rtlCol="0" anchor="ctr"/>
-            <a:lstStyle/>
-            <a:p>
-              <a:pPr algn="ctr"/>
-              <a:endParaRPr lang="de-DE"/>
-            </a:p>
-          </p:txBody>
-        </p:sp>
-        <p:cxnSp>
-          <p:nvCxnSpPr>
-            <p:cNvPr id="16" name="Gerade Verbindung mit Pfeil 15">
-              <a:extLst>
-                <a:ext uri="{FF2B5EF4-FFF2-40B4-BE49-F238E27FC236}">
-                  <a16:creationId xmlns:a16="http://schemas.microsoft.com/office/drawing/2014/main" id="{F852ADAC-D6AC-A826-9FD4-B50A5A6F903A}"/>
-                </a:ext>
-              </a:extLst>
-            </p:cNvPr>
-            <p:cNvCxnSpPr>
-              <a:cxnSpLocks/>
-            </p:cNvCxnSpPr>
-            <p:nvPr/>
-          </p:nvCxnSpPr>
-          <p:spPr>
-            <a:xfrm>
-              <a:off x="8277451" y="2711320"/>
-              <a:ext cx="918588" cy="391687"/>
-            </a:xfrm>
-            <a:prstGeom prst="straightConnector1">
-              <a:avLst/>
-            </a:prstGeom>
-            <a:ln>
-              <a:headEnd type="oval" w="med" len="med"/>
-              <a:tailEnd type="triangle" w="med" len="med"/>
-            </a:ln>
-          </p:spPr>
-          <p:style>
-            <a:lnRef idx="1">
-              <a:schemeClr val="dk1"/>
-            </a:lnRef>
-            <a:fillRef idx="0">
-              <a:schemeClr val="dk1"/>
-            </a:fillRef>
-            <a:effectRef idx="0">
-              <a:schemeClr val="dk1"/>
-            </a:effectRef>
-            <a:fontRef idx="minor">
-              <a:schemeClr val="tx1"/>
-            </a:fontRef>
-          </p:style>
-        </p:cxnSp>
-        <p:cxnSp>
-          <p:nvCxnSpPr>
-            <p:cNvPr id="17" name="Gerade Verbindung mit Pfeil 16">
-              <a:extLst>
-                <a:ext uri="{FF2B5EF4-FFF2-40B4-BE49-F238E27FC236}">
-                  <a16:creationId xmlns:a16="http://schemas.microsoft.com/office/drawing/2014/main" id="{5F54651D-4DA0-DC16-CF22-B256F209E6E9}"/>
-                </a:ext>
-              </a:extLst>
-            </p:cNvPr>
-            <p:cNvCxnSpPr>
-              <a:cxnSpLocks/>
-            </p:cNvCxnSpPr>
-            <p:nvPr/>
-          </p:nvCxnSpPr>
-          <p:spPr>
-            <a:xfrm flipH="1" flipV="1">
-              <a:off x="8298885" y="2247565"/>
-              <a:ext cx="361486" cy="706977"/>
-            </a:xfrm>
-            <a:prstGeom prst="straightConnector1">
-              <a:avLst/>
-            </a:prstGeom>
-            <a:ln>
-              <a:headEnd type="oval" w="med" len="med"/>
-              <a:tailEnd type="triangle" w="med" len="med"/>
-            </a:ln>
-          </p:spPr>
-          <p:style>
-            <a:lnRef idx="1">
-              <a:schemeClr val="dk1"/>
-            </a:lnRef>
-            <a:fillRef idx="0">
-              <a:schemeClr val="dk1"/>
-            </a:fillRef>
-            <a:effectRef idx="0">
-              <a:schemeClr val="dk1"/>
-            </a:effectRef>
-            <a:fontRef idx="minor">
-              <a:schemeClr val="tx1"/>
-            </a:fontRef>
-          </p:style>
-        </p:cxnSp>
-        <p:cxnSp>
-          <p:nvCxnSpPr>
-            <p:cNvPr id="18" name="Gerade Verbindung mit Pfeil 17">
-              <a:extLst>
-                <a:ext uri="{FF2B5EF4-FFF2-40B4-BE49-F238E27FC236}">
-                  <a16:creationId xmlns:a16="http://schemas.microsoft.com/office/drawing/2014/main" id="{4B7602EF-C06E-3CC8-489A-E1E09582BDEF}"/>
-                </a:ext>
-              </a:extLst>
-            </p:cNvPr>
-            <p:cNvCxnSpPr>
-              <a:cxnSpLocks/>
-            </p:cNvCxnSpPr>
-            <p:nvPr/>
-          </p:nvCxnSpPr>
-          <p:spPr>
-            <a:xfrm flipV="1">
-              <a:off x="8302271" y="2237681"/>
-              <a:ext cx="590227" cy="309187"/>
-            </a:xfrm>
-            <a:prstGeom prst="straightConnector1">
-              <a:avLst/>
-            </a:prstGeom>
-            <a:ln>
-              <a:headEnd type="oval" w="med" len="med"/>
-              <a:tailEnd type="triangle" w="med" len="med"/>
-            </a:ln>
-          </p:spPr>
-          <p:style>
-            <a:lnRef idx="1">
-              <a:schemeClr val="dk1"/>
-            </a:lnRef>
-            <a:fillRef idx="0">
-              <a:schemeClr val="dk1"/>
-            </a:fillRef>
-            <a:effectRef idx="0">
-              <a:schemeClr val="dk1"/>
-            </a:effectRef>
-            <a:fontRef idx="minor">
-              <a:schemeClr val="tx1"/>
-            </a:fontRef>
-          </p:style>
-        </p:cxnSp>
-        <p:cxnSp>
-          <p:nvCxnSpPr>
-            <p:cNvPr id="19" name="Gerade Verbindung mit Pfeil 18">
-              <a:extLst>
-                <a:ext uri="{FF2B5EF4-FFF2-40B4-BE49-F238E27FC236}">
-                  <a16:creationId xmlns:a16="http://schemas.microsoft.com/office/drawing/2014/main" id="{CA3420FF-6B0C-7B40-4960-7BEEB7BDEA1D}"/>
-                </a:ext>
-              </a:extLst>
-            </p:cNvPr>
-            <p:cNvCxnSpPr>
-              <a:cxnSpLocks/>
-            </p:cNvCxnSpPr>
-            <p:nvPr/>
-          </p:nvCxnSpPr>
-          <p:spPr>
-            <a:xfrm flipH="1">
-              <a:off x="8876371" y="2774995"/>
-              <a:ext cx="32254" cy="637278"/>
-            </a:xfrm>
-            <a:prstGeom prst="straightConnector1">
-              <a:avLst/>
-            </a:prstGeom>
-            <a:ln>
-              <a:headEnd type="oval" w="med" len="med"/>
-              <a:tailEnd type="triangle" w="med" len="med"/>
-            </a:ln>
-          </p:spPr>
-          <p:style>
-            <a:lnRef idx="1">
-              <a:schemeClr val="dk1"/>
-            </a:lnRef>
-            <a:fillRef idx="0">
-              <a:schemeClr val="dk1"/>
-            </a:fillRef>
-            <a:effectRef idx="0">
-              <a:schemeClr val="dk1"/>
-            </a:effectRef>
-            <a:fontRef idx="minor">
-              <a:schemeClr val="tx1"/>
-            </a:fontRef>
-          </p:style>
-        </p:cxnSp>
-        <p:cxnSp>
-          <p:nvCxnSpPr>
-            <p:cNvPr id="20" name="Gerade Verbindung mit Pfeil 19">
-              <a:extLst>
-                <a:ext uri="{FF2B5EF4-FFF2-40B4-BE49-F238E27FC236}">
-                  <a16:creationId xmlns:a16="http://schemas.microsoft.com/office/drawing/2014/main" id="{B04A4889-8FEE-D185-210D-AEF6A8EF0323}"/>
-                </a:ext>
-              </a:extLst>
-            </p:cNvPr>
-            <p:cNvCxnSpPr>
-              <a:cxnSpLocks/>
-            </p:cNvCxnSpPr>
-            <p:nvPr/>
-          </p:nvCxnSpPr>
-          <p:spPr>
-            <a:xfrm flipV="1">
-              <a:off x="8746039" y="2546868"/>
-              <a:ext cx="450000" cy="91739"/>
-            </a:xfrm>
-            <a:prstGeom prst="straightConnector1">
-              <a:avLst/>
-            </a:prstGeom>
-            <a:ln>
-              <a:headEnd type="oval" w="med" len="med"/>
-              <a:tailEnd type="triangle" w="med" len="med"/>
-            </a:ln>
-          </p:spPr>
-          <p:style>
-            <a:lnRef idx="1">
-              <a:schemeClr val="dk1"/>
-            </a:lnRef>
-            <a:fillRef idx="0">
-              <a:schemeClr val="dk1"/>
-            </a:fillRef>
-            <a:effectRef idx="0">
-              <a:schemeClr val="dk1"/>
-            </a:effectRef>
-            <a:fontRef idx="minor">
-              <a:schemeClr val="tx1"/>
-            </a:fontRef>
-          </p:style>
-        </p:cxnSp>
-        <p:cxnSp>
-          <p:nvCxnSpPr>
-            <p:cNvPr id="21" name="Gerade Verbindung mit Pfeil 20">
-              <a:extLst>
-                <a:ext uri="{FF2B5EF4-FFF2-40B4-BE49-F238E27FC236}">
-                  <a16:creationId xmlns:a16="http://schemas.microsoft.com/office/drawing/2014/main" id="{367D73EE-2022-B242-5B08-990FD446A34B}"/>
-                </a:ext>
-              </a:extLst>
-            </p:cNvPr>
-            <p:cNvCxnSpPr>
-              <a:cxnSpLocks/>
-            </p:cNvCxnSpPr>
-            <p:nvPr/>
-          </p:nvCxnSpPr>
-          <p:spPr>
-            <a:xfrm flipH="1" flipV="1">
-              <a:off x="7937400" y="2870807"/>
-              <a:ext cx="722971" cy="253147"/>
-            </a:xfrm>
-            <a:prstGeom prst="straightConnector1">
-              <a:avLst/>
-            </a:prstGeom>
-            <a:ln>
-              <a:headEnd type="oval" w="med" len="med"/>
-              <a:tailEnd type="triangle" w="med" len="med"/>
-            </a:ln>
-          </p:spPr>
-          <p:style>
-            <a:lnRef idx="1">
-              <a:schemeClr val="dk1"/>
-            </a:lnRef>
-            <a:fillRef idx="0">
-              <a:schemeClr val="dk1"/>
-            </a:fillRef>
-            <a:effectRef idx="0">
-              <a:schemeClr val="dk1"/>
-            </a:effectRef>
-            <a:fontRef idx="minor">
-              <a:schemeClr val="tx1"/>
-            </a:fontRef>
-          </p:style>
-        </p:cxnSp>
+          </p:grpSpPr>
+          <p:sp>
+            <p:nvSpPr>
+              <p:cNvPr id="14" name="Rechteck 13">
+                <a:extLst>
+                  <a:ext uri="{FF2B5EF4-FFF2-40B4-BE49-F238E27FC236}">
+                    <a16:creationId xmlns:a16="http://schemas.microsoft.com/office/drawing/2014/main" id="{DAB66B57-29EF-F3AE-E654-955382733B15}"/>
+                  </a:ext>
+                </a:extLst>
+              </p:cNvPr>
+              <p:cNvSpPr/>
+              <p:nvPr/>
+            </p:nvSpPr>
+            <p:spPr>
+              <a:xfrm>
+                <a:off x="8153400" y="2374977"/>
+                <a:ext cx="900000" cy="900000"/>
+              </a:xfrm>
+              <a:prstGeom prst="rect">
+                <a:avLst/>
+              </a:prstGeom>
+            </p:spPr>
+            <p:style>
+              <a:lnRef idx="2">
+                <a:schemeClr val="dk1"/>
+              </a:lnRef>
+              <a:fillRef idx="1">
+                <a:schemeClr val="lt1"/>
+              </a:fillRef>
+              <a:effectRef idx="0">
+                <a:schemeClr val="dk1"/>
+              </a:effectRef>
+              <a:fontRef idx="minor">
+                <a:schemeClr val="dk1"/>
+              </a:fontRef>
+            </p:style>
+            <p:txBody>
+              <a:bodyPr rtlCol="0" anchor="ctr"/>
+              <a:lstStyle/>
+              <a:p>
+                <a:pPr algn="ctr"/>
+                <a:endParaRPr lang="de-DE"/>
+              </a:p>
+            </p:txBody>
+          </p:sp>
+          <p:sp>
+            <p:nvSpPr>
+              <p:cNvPr id="15" name="Ellipse 14">
+                <a:extLst>
+                  <a:ext uri="{FF2B5EF4-FFF2-40B4-BE49-F238E27FC236}">
+                    <a16:creationId xmlns:a16="http://schemas.microsoft.com/office/drawing/2014/main" id="{B7ECE6AF-9A22-BE71-BC34-F021F48D1F17}"/>
+                  </a:ext>
+                </a:extLst>
+              </p:cNvPr>
+              <p:cNvSpPr/>
+              <p:nvPr/>
+            </p:nvSpPr>
+            <p:spPr>
+              <a:xfrm>
+                <a:off x="7937400" y="2158007"/>
+                <a:ext cx="1332000" cy="1332000"/>
+              </a:xfrm>
+              <a:prstGeom prst="ellipse">
+                <a:avLst/>
+              </a:prstGeom>
+              <a:noFill/>
+            </p:spPr>
+            <p:style>
+              <a:lnRef idx="2">
+                <a:schemeClr val="dk1"/>
+              </a:lnRef>
+              <a:fillRef idx="1">
+                <a:schemeClr val="lt1"/>
+              </a:fillRef>
+              <a:effectRef idx="0">
+                <a:schemeClr val="dk1"/>
+              </a:effectRef>
+              <a:fontRef idx="minor">
+                <a:schemeClr val="dk1"/>
+              </a:fontRef>
+            </p:style>
+            <p:txBody>
+              <a:bodyPr rtlCol="0" anchor="ctr"/>
+              <a:lstStyle/>
+              <a:p>
+                <a:pPr algn="ctr"/>
+                <a:endParaRPr lang="de-DE"/>
+              </a:p>
+            </p:txBody>
+          </p:sp>
+          <p:cxnSp>
+            <p:nvCxnSpPr>
+              <p:cNvPr id="16" name="Gerade Verbindung mit Pfeil 15">
+                <a:extLst>
+                  <a:ext uri="{FF2B5EF4-FFF2-40B4-BE49-F238E27FC236}">
+                    <a16:creationId xmlns:a16="http://schemas.microsoft.com/office/drawing/2014/main" id="{F852ADAC-D6AC-A826-9FD4-B50A5A6F903A}"/>
+                  </a:ext>
+                </a:extLst>
+              </p:cNvPr>
+              <p:cNvCxnSpPr>
+                <a:cxnSpLocks/>
+              </p:cNvCxnSpPr>
+              <p:nvPr/>
+            </p:nvCxnSpPr>
+            <p:spPr>
+              <a:xfrm>
+                <a:off x="8277451" y="2711320"/>
+                <a:ext cx="918588" cy="391687"/>
+              </a:xfrm>
+              <a:prstGeom prst="straightConnector1">
+                <a:avLst/>
+              </a:prstGeom>
+              <a:ln>
+                <a:headEnd type="oval" w="med" len="med"/>
+                <a:tailEnd type="triangle" w="med" len="med"/>
+              </a:ln>
+            </p:spPr>
+            <p:style>
+              <a:lnRef idx="1">
+                <a:schemeClr val="dk1"/>
+              </a:lnRef>
+              <a:fillRef idx="0">
+                <a:schemeClr val="dk1"/>
+              </a:fillRef>
+              <a:effectRef idx="0">
+                <a:schemeClr val="dk1"/>
+              </a:effectRef>
+              <a:fontRef idx="minor">
+                <a:schemeClr val="tx1"/>
+              </a:fontRef>
+            </p:style>
+          </p:cxnSp>
+          <p:cxnSp>
+            <p:nvCxnSpPr>
+              <p:cNvPr id="17" name="Gerade Verbindung mit Pfeil 16">
+                <a:extLst>
+                  <a:ext uri="{FF2B5EF4-FFF2-40B4-BE49-F238E27FC236}">
+                    <a16:creationId xmlns:a16="http://schemas.microsoft.com/office/drawing/2014/main" id="{5F54651D-4DA0-DC16-CF22-B256F209E6E9}"/>
+                  </a:ext>
+                </a:extLst>
+              </p:cNvPr>
+              <p:cNvCxnSpPr>
+                <a:cxnSpLocks/>
+              </p:cNvCxnSpPr>
+              <p:nvPr/>
+            </p:nvCxnSpPr>
+            <p:spPr>
+              <a:xfrm flipH="1" flipV="1">
+                <a:off x="8298885" y="2247565"/>
+                <a:ext cx="361486" cy="706977"/>
+              </a:xfrm>
+              <a:prstGeom prst="straightConnector1">
+                <a:avLst/>
+              </a:prstGeom>
+              <a:ln>
+                <a:headEnd type="oval" w="med" len="med"/>
+                <a:tailEnd type="triangle" w="med" len="med"/>
+              </a:ln>
+            </p:spPr>
+            <p:style>
+              <a:lnRef idx="1">
+                <a:schemeClr val="dk1"/>
+              </a:lnRef>
+              <a:fillRef idx="0">
+                <a:schemeClr val="dk1"/>
+              </a:fillRef>
+              <a:effectRef idx="0">
+                <a:schemeClr val="dk1"/>
+              </a:effectRef>
+              <a:fontRef idx="minor">
+                <a:schemeClr val="tx1"/>
+              </a:fontRef>
+            </p:style>
+          </p:cxnSp>
+          <p:cxnSp>
+            <p:nvCxnSpPr>
+              <p:cNvPr id="18" name="Gerade Verbindung mit Pfeil 17">
+                <a:extLst>
+                  <a:ext uri="{FF2B5EF4-FFF2-40B4-BE49-F238E27FC236}">
+                    <a16:creationId xmlns:a16="http://schemas.microsoft.com/office/drawing/2014/main" id="{4B7602EF-C06E-3CC8-489A-E1E09582BDEF}"/>
+                  </a:ext>
+                </a:extLst>
+              </p:cNvPr>
+              <p:cNvCxnSpPr>
+                <a:cxnSpLocks/>
+              </p:cNvCxnSpPr>
+              <p:nvPr/>
+            </p:nvCxnSpPr>
+            <p:spPr>
+              <a:xfrm flipV="1">
+                <a:off x="8302271" y="2237681"/>
+                <a:ext cx="590227" cy="309187"/>
+              </a:xfrm>
+              <a:prstGeom prst="straightConnector1">
+                <a:avLst/>
+              </a:prstGeom>
+              <a:ln>
+                <a:headEnd type="oval" w="med" len="med"/>
+                <a:tailEnd type="triangle" w="med" len="med"/>
+              </a:ln>
+            </p:spPr>
+            <p:style>
+              <a:lnRef idx="1">
+                <a:schemeClr val="dk1"/>
+              </a:lnRef>
+              <a:fillRef idx="0">
+                <a:schemeClr val="dk1"/>
+              </a:fillRef>
+              <a:effectRef idx="0">
+                <a:schemeClr val="dk1"/>
+              </a:effectRef>
+              <a:fontRef idx="minor">
+                <a:schemeClr val="tx1"/>
+              </a:fontRef>
+            </p:style>
+          </p:cxnSp>
+          <p:cxnSp>
+            <p:nvCxnSpPr>
+              <p:cNvPr id="19" name="Gerade Verbindung mit Pfeil 18">
+                <a:extLst>
+                  <a:ext uri="{FF2B5EF4-FFF2-40B4-BE49-F238E27FC236}">
+                    <a16:creationId xmlns:a16="http://schemas.microsoft.com/office/drawing/2014/main" id="{CA3420FF-6B0C-7B40-4960-7BEEB7BDEA1D}"/>
+                  </a:ext>
+                </a:extLst>
+              </p:cNvPr>
+              <p:cNvCxnSpPr>
+                <a:cxnSpLocks/>
+              </p:cNvCxnSpPr>
+              <p:nvPr/>
+            </p:nvCxnSpPr>
+            <p:spPr>
+              <a:xfrm flipH="1">
+                <a:off x="8876371" y="2774995"/>
+                <a:ext cx="32254" cy="637278"/>
+              </a:xfrm>
+              <a:prstGeom prst="straightConnector1">
+                <a:avLst/>
+              </a:prstGeom>
+              <a:ln>
+                <a:headEnd type="oval" w="med" len="med"/>
+                <a:tailEnd type="triangle" w="med" len="med"/>
+              </a:ln>
+            </p:spPr>
+            <p:style>
+              <a:lnRef idx="1">
+                <a:schemeClr val="dk1"/>
+              </a:lnRef>
+              <a:fillRef idx="0">
+                <a:schemeClr val="dk1"/>
+              </a:fillRef>
+              <a:effectRef idx="0">
+                <a:schemeClr val="dk1"/>
+              </a:effectRef>
+              <a:fontRef idx="minor">
+                <a:schemeClr val="tx1"/>
+              </a:fontRef>
+            </p:style>
+          </p:cxnSp>
+          <p:cxnSp>
+            <p:nvCxnSpPr>
+              <p:cNvPr id="20" name="Gerade Verbindung mit Pfeil 19">
+                <a:extLst>
+                  <a:ext uri="{FF2B5EF4-FFF2-40B4-BE49-F238E27FC236}">
+                    <a16:creationId xmlns:a16="http://schemas.microsoft.com/office/drawing/2014/main" id="{B04A4889-8FEE-D185-210D-AEF6A8EF0323}"/>
+                  </a:ext>
+                </a:extLst>
+              </p:cNvPr>
+              <p:cNvCxnSpPr>
+                <a:cxnSpLocks/>
+              </p:cNvCxnSpPr>
+              <p:nvPr/>
+            </p:nvCxnSpPr>
+            <p:spPr>
+              <a:xfrm flipV="1">
+                <a:off x="8746039" y="2546868"/>
+                <a:ext cx="450000" cy="91739"/>
+              </a:xfrm>
+              <a:prstGeom prst="straightConnector1">
+                <a:avLst/>
+              </a:prstGeom>
+              <a:ln>
+                <a:headEnd type="oval" w="med" len="med"/>
+                <a:tailEnd type="triangle" w="med" len="med"/>
+              </a:ln>
+            </p:spPr>
+            <p:style>
+              <a:lnRef idx="1">
+                <a:schemeClr val="dk1"/>
+              </a:lnRef>
+              <a:fillRef idx="0">
+                <a:schemeClr val="dk1"/>
+              </a:fillRef>
+              <a:effectRef idx="0">
+                <a:schemeClr val="dk1"/>
+              </a:effectRef>
+              <a:fontRef idx="minor">
+                <a:schemeClr val="tx1"/>
+              </a:fontRef>
+            </p:style>
+          </p:cxnSp>
+          <p:cxnSp>
+            <p:nvCxnSpPr>
+              <p:cNvPr id="21" name="Gerade Verbindung mit Pfeil 20">
+                <a:extLst>
+                  <a:ext uri="{FF2B5EF4-FFF2-40B4-BE49-F238E27FC236}">
+                    <a16:creationId xmlns:a16="http://schemas.microsoft.com/office/drawing/2014/main" id="{367D73EE-2022-B242-5B08-990FD446A34B}"/>
+                  </a:ext>
+                </a:extLst>
+              </p:cNvPr>
+              <p:cNvCxnSpPr>
+                <a:cxnSpLocks/>
+              </p:cNvCxnSpPr>
+              <p:nvPr/>
+            </p:nvCxnSpPr>
+            <p:spPr>
+              <a:xfrm flipH="1" flipV="1">
+                <a:off x="7937400" y="2870807"/>
+                <a:ext cx="722971" cy="253147"/>
+              </a:xfrm>
+              <a:prstGeom prst="straightConnector1">
+                <a:avLst/>
+              </a:prstGeom>
+              <a:ln>
+                <a:headEnd type="oval" w="med" len="med"/>
+                <a:tailEnd type="triangle" w="med" len="med"/>
+              </a:ln>
+            </p:spPr>
+            <p:style>
+              <a:lnRef idx="1">
+                <a:schemeClr val="dk1"/>
+              </a:lnRef>
+              <a:fillRef idx="0">
+                <a:schemeClr val="dk1"/>
+              </a:fillRef>
+              <a:effectRef idx="0">
+                <a:schemeClr val="dk1"/>
+              </a:effectRef>
+              <a:fontRef idx="minor">
+                <a:schemeClr val="tx1"/>
+              </a:fontRef>
+            </p:style>
+          </p:cxnSp>
+        </p:grpSp>
       </p:grpSp>
     </p:spTree>
     <p:extLst>
@@ -4052,81 +4203,6 @@
   <p:clrMapOvr>
     <a:masterClrMapping/>
   </p:clrMapOvr>
-  <p:timing>
-    <p:tnLst>
-      <p:par>
-        <p:cTn id="1" dur="indefinite" restart="never" nodeType="tmRoot">
-          <p:childTnLst>
-            <p:seq concurrent="1" nextAc="seek">
-              <p:cTn id="2" dur="indefinite" nodeType="mainSeq">
-                <p:childTnLst>
-                  <p:par>
-                    <p:cTn id="3" fill="hold">
-                      <p:stCondLst>
-                        <p:cond delay="indefinite"/>
-                      </p:stCondLst>
-                      <p:childTnLst>
-                        <p:par>
-                          <p:cTn id="4" fill="hold">
-                            <p:stCondLst>
-                              <p:cond delay="0"/>
-                            </p:stCondLst>
-                            <p:childTnLst>
-                              <p:par>
-                                <p:cTn id="5" presetID="1" presetClass="entr" presetSubtype="0" fill="hold" nodeType="clickEffect">
-                                  <p:stCondLst>
-                                    <p:cond delay="0"/>
-                                  </p:stCondLst>
-                                  <p:childTnLst>
-                                    <p:set>
-                                      <p:cBhvr>
-                                        <p:cTn id="6" dur="1" fill="hold">
-                                          <p:stCondLst>
-                                            <p:cond delay="0"/>
-                                          </p:stCondLst>
-                                        </p:cTn>
-                                        <p:tgtEl>
-                                          <p:spTgt spid="13"/>
-                                        </p:tgtEl>
-                                        <p:attrNameLst>
-                                          <p:attrName>style.visibility</p:attrName>
-                                        </p:attrNameLst>
-                                      </p:cBhvr>
-                                      <p:to>
-                                        <p:strVal val="visible"/>
-                                      </p:to>
-                                    </p:set>
-                                  </p:childTnLst>
-                                </p:cTn>
-                              </p:par>
-                            </p:childTnLst>
-                          </p:cTn>
-                        </p:par>
-                      </p:childTnLst>
-                    </p:cTn>
-                  </p:par>
-                </p:childTnLst>
-              </p:cTn>
-              <p:prevCondLst>
-                <p:cond evt="onPrev" delay="0">
-                  <p:tgtEl>
-                    <p:sldTgt/>
-                  </p:tgtEl>
-                </p:cond>
-              </p:prevCondLst>
-              <p:nextCondLst>
-                <p:cond evt="onNext" delay="0">
-                  <p:tgtEl>
-                    <p:sldTgt/>
-                  </p:tgtEl>
-                </p:cond>
-              </p:nextCondLst>
-            </p:seq>
-          </p:childTnLst>
-        </p:cTn>
-      </p:par>
-    </p:tnLst>
-  </p:timing>
 </p:sld>
 </file>
 

</xml_diff>